<commit_message>
Its dangerous to go alone, take this poster upate
</commit_message>
<xml_diff>
--- a/Documentation/Poster/Poster.pptx
+++ b/Documentation/Poster/Poster.pptx
@@ -3875,8 +3875,8 @@
         </p:nvSpPr>
         <p:spPr>
           <a:xfrm>
-            <a:off x="14556322" y="3912067"/>
-            <a:ext cx="14778556" cy="28650734"/>
+            <a:off x="14556322" y="4923663"/>
+            <a:ext cx="14778556" cy="27639137"/>
           </a:xfrm>
           <a:prstGeom prst="roundRect">
             <a:avLst/>
@@ -3919,8 +3919,8 @@
         </p:nvSpPr>
         <p:spPr>
           <a:xfrm>
-            <a:off x="29840848" y="4216967"/>
-            <a:ext cx="13334863" cy="9550299"/>
+            <a:off x="29840848" y="4923664"/>
+            <a:ext cx="13334863" cy="8843602"/>
           </a:xfrm>
           <a:prstGeom prst="roundRect">
             <a:avLst/>
@@ -4129,7 +4129,7 @@
         </p:nvSpPr>
         <p:spPr>
           <a:xfrm>
-            <a:off x="17538732" y="4110864"/>
+            <a:off x="17538732" y="4923664"/>
             <a:ext cx="9498760" cy="1366528"/>
           </a:xfrm>
           <a:prstGeom prst="rect">
@@ -4171,7 +4171,7 @@
         </p:nvSpPr>
         <p:spPr>
           <a:xfrm>
-            <a:off x="32363297" y="4284728"/>
+            <a:off x="32363297" y="4945128"/>
             <a:ext cx="8456171" cy="1366528"/>
           </a:xfrm>
           <a:prstGeom prst="rect">
@@ -4520,7 +4520,7 @@
         </p:blipFill>
         <p:spPr>
           <a:xfrm>
-            <a:off x="22418635" y="12969640"/>
+            <a:off x="22418635" y="13782440"/>
             <a:ext cx="6350000" cy="4165601"/>
           </a:xfrm>
           <a:prstGeom prst="rect">
@@ -4550,7 +4550,7 @@
         </p:blipFill>
         <p:spPr>
           <a:xfrm>
-            <a:off x="21005800" y="17513277"/>
+            <a:off x="21005800" y="18326077"/>
             <a:ext cx="7838359" cy="3986857"/>
           </a:xfrm>
           <a:prstGeom prst="rect">
@@ -4566,7 +4566,7 @@
         </p:nvSpPr>
         <p:spPr>
           <a:xfrm>
-            <a:off x="14874133" y="12986094"/>
+            <a:off x="14874133" y="13798894"/>
             <a:ext cx="7350867" cy="3046988"/>
           </a:xfrm>
           <a:prstGeom prst="rect">
@@ -4711,7 +4711,7 @@
         </p:nvSpPr>
         <p:spPr>
           <a:xfrm>
-            <a:off x="15470638" y="12091990"/>
+            <a:off x="15470638" y="12904790"/>
             <a:ext cx="4313327" cy="769441"/>
           </a:xfrm>
           <a:prstGeom prst="rect">
@@ -4753,7 +4753,7 @@
         </p:nvSpPr>
         <p:spPr>
           <a:xfrm>
-            <a:off x="15519400" y="21336000"/>
+            <a:off x="15519400" y="22148800"/>
             <a:ext cx="4138409" cy="769441"/>
           </a:xfrm>
           <a:prstGeom prst="rect">
@@ -4795,7 +4795,7 @@
         </p:nvSpPr>
         <p:spPr>
           <a:xfrm>
-            <a:off x="14874132" y="22322135"/>
+            <a:off x="14874132" y="23134935"/>
             <a:ext cx="13970027" cy="1569660"/>
           </a:xfrm>
           <a:prstGeom prst="rect">
@@ -4872,341 +4872,6 @@
               <a:latin typeface="BlairMdITC TT-Medium"/>
               <a:cs typeface="BlairMdITC TT-Medium"/>
             </a:endParaRPr>
-          </a:p>
-        </p:txBody>
-      </p:sp>
-      <p:pic>
-        <p:nvPicPr>
-          <p:cNvPr id="45" name="Picture 44" descr="electric car.jpg"/>
-          <p:cNvPicPr>
-            <a:picLocks noChangeAspect="1"/>
-          </p:cNvPicPr>
-          <p:nvPr/>
-        </p:nvPicPr>
-        <p:blipFill>
-          <a:blip r:embed="rId9">
-            <a:extLst>
-              <a:ext uri="{28A0092B-C50C-407E-A947-70E740481C1C}">
-                <a14:useLocalDpi xmlns:a14="http://schemas.microsoft.com/office/drawing/2010/main" val="0"/>
-              </a:ext>
-            </a:extLst>
-          </a:blip>
-          <a:stretch>
-            <a:fillRect/>
-          </a:stretch>
-        </p:blipFill>
-        <p:spPr>
-          <a:xfrm>
-            <a:off x="15019108" y="9216959"/>
-            <a:ext cx="3819368" cy="2396615"/>
-          </a:xfrm>
-          <a:prstGeom prst="rect">
-            <a:avLst/>
-          </a:prstGeom>
-        </p:spPr>
-      </p:pic>
-      <p:sp>
-        <p:nvSpPr>
-          <p:cNvPr id="46" name="Up Arrow 45"/>
-          <p:cNvSpPr/>
-          <p:nvPr/>
-        </p:nvSpPr>
-        <p:spPr>
-          <a:xfrm>
-            <a:off x="16250005" y="7477204"/>
-            <a:ext cx="1318879" cy="1624303"/>
-          </a:xfrm>
-          <a:prstGeom prst="upArrow">
-            <a:avLst/>
-          </a:prstGeom>
-        </p:spPr>
-        <p:style>
-          <a:lnRef idx="1">
-            <a:schemeClr val="accent1"/>
-          </a:lnRef>
-          <a:fillRef idx="3">
-            <a:schemeClr val="accent1"/>
-          </a:fillRef>
-          <a:effectRef idx="2">
-            <a:schemeClr val="accent1"/>
-          </a:effectRef>
-          <a:fontRef idx="minor">
-            <a:schemeClr val="lt1"/>
-          </a:fontRef>
-        </p:style>
-        <p:txBody>
-          <a:bodyPr rtlCol="0" anchor="ctr"/>
-          <a:lstStyle/>
-          <a:p>
-            <a:pPr algn="ctr"/>
-            <a:endParaRPr lang="en-US"/>
-          </a:p>
-        </p:txBody>
-      </p:sp>
-      <p:sp>
-        <p:nvSpPr>
-          <p:cNvPr id="47" name="Alternate Process 46"/>
-          <p:cNvSpPr/>
-          <p:nvPr/>
-        </p:nvSpPr>
-        <p:spPr>
-          <a:xfrm>
-            <a:off x="15019108" y="5653488"/>
-            <a:ext cx="3376327" cy="1729322"/>
-          </a:xfrm>
-          <a:prstGeom prst="flowChartAlternateProcess">
-            <a:avLst/>
-          </a:prstGeom>
-        </p:spPr>
-        <p:style>
-          <a:lnRef idx="1">
-            <a:schemeClr val="accent1"/>
-          </a:lnRef>
-          <a:fillRef idx="3">
-            <a:schemeClr val="accent1"/>
-          </a:fillRef>
-          <a:effectRef idx="2">
-            <a:schemeClr val="accent1"/>
-          </a:effectRef>
-          <a:fontRef idx="minor">
-            <a:schemeClr val="lt1"/>
-          </a:fontRef>
-        </p:style>
-        <p:txBody>
-          <a:bodyPr rtlCol="0" anchor="ctr"/>
-          <a:lstStyle/>
-          <a:p>
-            <a:pPr algn="ctr"/>
-            <a:r>
-              <a:rPr lang="en-US" sz="3200" dirty="0" smtClean="0"/>
-              <a:t>CAN Transceivers</a:t>
-            </a:r>
-            <a:endParaRPr lang="en-US" sz="3200" dirty="0"/>
-          </a:p>
-        </p:txBody>
-      </p:sp>
-      <p:sp>
-        <p:nvSpPr>
-          <p:cNvPr id="48" name="Up Arrow 47"/>
-          <p:cNvSpPr/>
-          <p:nvPr/>
-        </p:nvSpPr>
-        <p:spPr>
-          <a:xfrm rot="5400000">
-            <a:off x="18692278" y="5650944"/>
-            <a:ext cx="1318878" cy="1624302"/>
-          </a:xfrm>
-          <a:prstGeom prst="upArrow">
-            <a:avLst/>
-          </a:prstGeom>
-        </p:spPr>
-        <p:style>
-          <a:lnRef idx="1">
-            <a:schemeClr val="accent1"/>
-          </a:lnRef>
-          <a:fillRef idx="3">
-            <a:schemeClr val="accent1"/>
-          </a:fillRef>
-          <a:effectRef idx="2">
-            <a:schemeClr val="accent1"/>
-          </a:effectRef>
-          <a:fontRef idx="minor">
-            <a:schemeClr val="lt1"/>
-          </a:fontRef>
-        </p:style>
-        <p:txBody>
-          <a:bodyPr rtlCol="0" anchor="ctr"/>
-          <a:lstStyle/>
-          <a:p>
-            <a:pPr algn="ctr"/>
-            <a:endParaRPr lang="en-US"/>
-          </a:p>
-        </p:txBody>
-      </p:sp>
-      <p:sp>
-        <p:nvSpPr>
-          <p:cNvPr id="52" name="Up Arrow 51"/>
-          <p:cNvSpPr/>
-          <p:nvPr/>
-        </p:nvSpPr>
-        <p:spPr>
-          <a:xfrm rot="10800000">
-            <a:off x="26540514" y="7594120"/>
-            <a:ext cx="1318879" cy="1624303"/>
-          </a:xfrm>
-          <a:prstGeom prst="upArrow">
-            <a:avLst/>
-          </a:prstGeom>
-        </p:spPr>
-        <p:style>
-          <a:lnRef idx="1">
-            <a:schemeClr val="accent1"/>
-          </a:lnRef>
-          <a:fillRef idx="3">
-            <a:schemeClr val="accent1"/>
-          </a:fillRef>
-          <a:effectRef idx="2">
-            <a:schemeClr val="accent1"/>
-          </a:effectRef>
-          <a:fontRef idx="minor">
-            <a:schemeClr val="lt1"/>
-          </a:fontRef>
-        </p:style>
-        <p:txBody>
-          <a:bodyPr rtlCol="0" anchor="ctr"/>
-          <a:lstStyle/>
-          <a:p>
-            <a:pPr algn="ctr"/>
-            <a:endParaRPr lang="en-US"/>
-          </a:p>
-        </p:txBody>
-      </p:sp>
-      <p:pic>
-        <p:nvPicPr>
-          <p:cNvPr id="53" name="Picture 52" descr="EV1.JPG"/>
-          <p:cNvPicPr>
-            <a:picLocks noChangeAspect="1"/>
-          </p:cNvPicPr>
-          <p:nvPr/>
-        </p:nvPicPr>
-        <p:blipFill rotWithShape="1">
-          <a:blip r:embed="rId10">
-            <a:extLst>
-              <a:ext uri="{28A0092B-C50C-407E-A947-70E740481C1C}">
-                <a14:useLocalDpi xmlns:a14="http://schemas.microsoft.com/office/drawing/2010/main" val="0"/>
-              </a:ext>
-            </a:extLst>
-          </a:blip>
-          <a:srcRect l="34578"/>
-          <a:stretch/>
-        </p:blipFill>
-        <p:spPr>
-          <a:xfrm rot="5400000">
-            <a:off x="25733373" y="9077779"/>
-            <a:ext cx="2972809" cy="3408032"/>
-          </a:xfrm>
-          <a:prstGeom prst="rect">
-            <a:avLst/>
-          </a:prstGeom>
-        </p:spPr>
-      </p:pic>
-      <p:sp>
-        <p:nvSpPr>
-          <p:cNvPr id="55" name="Up Arrow 54"/>
-          <p:cNvSpPr/>
-          <p:nvPr/>
-        </p:nvSpPr>
-        <p:spPr>
-          <a:xfrm rot="5400000">
-            <a:off x="23911912" y="5650944"/>
-            <a:ext cx="1318878" cy="1624302"/>
-          </a:xfrm>
-          <a:prstGeom prst="upArrow">
-            <a:avLst/>
-          </a:prstGeom>
-        </p:spPr>
-        <p:style>
-          <a:lnRef idx="1">
-            <a:schemeClr val="accent1"/>
-          </a:lnRef>
-          <a:fillRef idx="3">
-            <a:schemeClr val="accent1"/>
-          </a:fillRef>
-          <a:effectRef idx="2">
-            <a:schemeClr val="accent1"/>
-          </a:effectRef>
-          <a:fontRef idx="minor">
-            <a:schemeClr val="lt1"/>
-          </a:fontRef>
-        </p:style>
-        <p:txBody>
-          <a:bodyPr rtlCol="0" anchor="ctr"/>
-          <a:lstStyle/>
-          <a:p>
-            <a:pPr algn="ctr"/>
-            <a:endParaRPr lang="en-US"/>
-          </a:p>
-        </p:txBody>
-      </p:sp>
-      <p:sp>
-        <p:nvSpPr>
-          <p:cNvPr id="57" name="Alternate Process 56"/>
-          <p:cNvSpPr/>
-          <p:nvPr/>
-        </p:nvSpPr>
-        <p:spPr>
-          <a:xfrm>
-            <a:off x="20244722" y="5653488"/>
-            <a:ext cx="3376327" cy="1729322"/>
-          </a:xfrm>
-          <a:prstGeom prst="flowChartAlternateProcess">
-            <a:avLst/>
-          </a:prstGeom>
-        </p:spPr>
-        <p:style>
-          <a:lnRef idx="1">
-            <a:schemeClr val="accent1"/>
-          </a:lnRef>
-          <a:fillRef idx="3">
-            <a:schemeClr val="accent1"/>
-          </a:fillRef>
-          <a:effectRef idx="2">
-            <a:schemeClr val="accent1"/>
-          </a:effectRef>
-          <a:fontRef idx="minor">
-            <a:schemeClr val="lt1"/>
-          </a:fontRef>
-        </p:style>
-        <p:txBody>
-          <a:bodyPr rtlCol="0" anchor="ctr"/>
-          <a:lstStyle/>
-          <a:p>
-            <a:pPr algn="ctr"/>
-            <a:r>
-              <a:rPr lang="en-US" sz="3200" dirty="0" smtClean="0"/>
-              <a:t>Microprocessor</a:t>
-            </a:r>
-          </a:p>
-        </p:txBody>
-      </p:sp>
-      <p:sp>
-        <p:nvSpPr>
-          <p:cNvPr id="58" name="Alternate Process 57"/>
-          <p:cNvSpPr/>
-          <p:nvPr/>
-        </p:nvSpPr>
-        <p:spPr>
-          <a:xfrm>
-            <a:off x="25464701" y="5722645"/>
-            <a:ext cx="3376327" cy="1729322"/>
-          </a:xfrm>
-          <a:prstGeom prst="flowChartAlternateProcess">
-            <a:avLst/>
-          </a:prstGeom>
-        </p:spPr>
-        <p:style>
-          <a:lnRef idx="1">
-            <a:schemeClr val="accent1"/>
-          </a:lnRef>
-          <a:fillRef idx="3">
-            <a:schemeClr val="accent1"/>
-          </a:fillRef>
-          <a:effectRef idx="2">
-            <a:schemeClr val="accent1"/>
-          </a:effectRef>
-          <a:fontRef idx="minor">
-            <a:schemeClr val="lt1"/>
-          </a:fontRef>
-        </p:style>
-        <p:txBody>
-          <a:bodyPr rtlCol="0" anchor="ctr"/>
-          <a:lstStyle/>
-          <a:p>
-            <a:pPr algn="ctr"/>
-            <a:r>
-              <a:rPr lang="en-US" sz="3200" dirty="0" smtClean="0"/>
-              <a:t>Screen</a:t>
-            </a:r>
           </a:p>
         </p:txBody>
       </p:sp>
@@ -5296,7 +4961,7 @@
           <p:nvPr/>
         </p:nvPicPr>
         <p:blipFill>
-          <a:blip r:embed="rId11"/>
+          <a:blip r:embed="rId9"/>
           <a:stretch>
             <a:fillRect/>
           </a:stretch>
@@ -5319,7 +4984,7 @@
         </p:nvSpPr>
         <p:spPr>
           <a:xfrm>
-            <a:off x="14874133" y="15943617"/>
+            <a:off x="14874133" y="16756417"/>
             <a:ext cx="7350868" cy="1569660"/>
           </a:xfrm>
           <a:prstGeom prst="rect">
@@ -5366,7 +5031,7 @@
         </p:nvSpPr>
         <p:spPr>
           <a:xfrm>
-            <a:off x="14874132" y="17343455"/>
+            <a:off x="14874132" y="18156255"/>
             <a:ext cx="5880126" cy="4031873"/>
           </a:xfrm>
           <a:prstGeom prst="rect">
@@ -5417,48 +5082,398 @@
           </a:p>
         </p:txBody>
       </p:sp>
-      <p:sp>
-        <p:nvSpPr>
-          <p:cNvPr id="49" name="Rectangle 48"/>
-          <p:cNvSpPr/>
+      <p:grpSp>
+        <p:nvGrpSpPr>
+          <p:cNvPr id="38" name="Group 37"/>
+          <p:cNvGrpSpPr/>
           <p:nvPr/>
-        </p:nvSpPr>
-        <p:spPr>
-          <a:xfrm>
-            <a:off x="19596083" y="8381798"/>
-            <a:ext cx="5257833" cy="3354592"/>
-          </a:xfrm>
-          <a:prstGeom prst="rect">
-            <a:avLst/>
-          </a:prstGeom>
-        </p:spPr>
-        <p:style>
-          <a:lnRef idx="1">
-            <a:schemeClr val="accent1"/>
-          </a:lnRef>
-          <a:fillRef idx="3">
-            <a:schemeClr val="accent1"/>
-          </a:fillRef>
-          <a:effectRef idx="2">
-            <a:schemeClr val="accent1"/>
-          </a:effectRef>
-          <a:fontRef idx="minor">
-            <a:schemeClr val="lt1"/>
-          </a:fontRef>
-        </p:style>
-        <p:txBody>
-          <a:bodyPr rtlCol="0" anchor="ctr"/>
-          <a:lstStyle/>
-          <a:p>
-            <a:pPr algn="ctr"/>
-            <a:r>
-              <a:rPr lang="en-US" sz="3000" dirty="0" smtClean="0"/>
-              <a:t>Picture of whole unit here</a:t>
-            </a:r>
-            <a:endParaRPr lang="en-US" sz="3000" dirty="0"/>
-          </a:p>
-        </p:txBody>
-      </p:sp>
+        </p:nvGrpSpPr>
+        <p:grpSpPr>
+          <a:xfrm>
+            <a:off x="15019108" y="6466288"/>
+            <a:ext cx="13904686" cy="6614711"/>
+            <a:chOff x="15019108" y="5653488"/>
+            <a:chExt cx="13904686" cy="6614711"/>
+          </a:xfrm>
+        </p:grpSpPr>
+        <p:pic>
+          <p:nvPicPr>
+            <p:cNvPr id="45" name="Picture 44" descr="electric car.jpg"/>
+            <p:cNvPicPr>
+              <a:picLocks noChangeAspect="1"/>
+            </p:cNvPicPr>
+            <p:nvPr/>
+          </p:nvPicPr>
+          <p:blipFill>
+            <a:blip r:embed="rId10">
+              <a:extLst>
+                <a:ext uri="{28A0092B-C50C-407E-A947-70E740481C1C}">
+                  <a14:useLocalDpi xmlns:a14="http://schemas.microsoft.com/office/drawing/2010/main" val="0"/>
+                </a:ext>
+              </a:extLst>
+            </a:blip>
+            <a:stretch>
+              <a:fillRect/>
+            </a:stretch>
+          </p:blipFill>
+          <p:spPr>
+            <a:xfrm>
+              <a:off x="15019108" y="9216959"/>
+              <a:ext cx="3819368" cy="2396615"/>
+            </a:xfrm>
+            <a:prstGeom prst="rect">
+              <a:avLst/>
+            </a:prstGeom>
+          </p:spPr>
+        </p:pic>
+        <p:sp>
+          <p:nvSpPr>
+            <p:cNvPr id="46" name="Up Arrow 45"/>
+            <p:cNvSpPr/>
+            <p:nvPr/>
+          </p:nvSpPr>
+          <p:spPr>
+            <a:xfrm>
+              <a:off x="16250005" y="7477204"/>
+              <a:ext cx="1318879" cy="1624303"/>
+            </a:xfrm>
+            <a:prstGeom prst="upArrow">
+              <a:avLst/>
+            </a:prstGeom>
+          </p:spPr>
+          <p:style>
+            <a:lnRef idx="1">
+              <a:schemeClr val="accent1"/>
+            </a:lnRef>
+            <a:fillRef idx="3">
+              <a:schemeClr val="accent1"/>
+            </a:fillRef>
+            <a:effectRef idx="2">
+              <a:schemeClr val="accent1"/>
+            </a:effectRef>
+            <a:fontRef idx="minor">
+              <a:schemeClr val="lt1"/>
+            </a:fontRef>
+          </p:style>
+          <p:txBody>
+            <a:bodyPr rtlCol="0" anchor="ctr"/>
+            <a:lstStyle/>
+            <a:p>
+              <a:pPr algn="ctr"/>
+              <a:endParaRPr lang="en-US"/>
+            </a:p>
+          </p:txBody>
+        </p:sp>
+        <p:sp>
+          <p:nvSpPr>
+            <p:cNvPr id="47" name="Alternate Process 46"/>
+            <p:cNvSpPr/>
+            <p:nvPr/>
+          </p:nvSpPr>
+          <p:spPr>
+            <a:xfrm>
+              <a:off x="15019108" y="5653488"/>
+              <a:ext cx="3376327" cy="1729322"/>
+            </a:xfrm>
+            <a:prstGeom prst="flowChartAlternateProcess">
+              <a:avLst/>
+            </a:prstGeom>
+          </p:spPr>
+          <p:style>
+            <a:lnRef idx="1">
+              <a:schemeClr val="accent1"/>
+            </a:lnRef>
+            <a:fillRef idx="3">
+              <a:schemeClr val="accent1"/>
+            </a:fillRef>
+            <a:effectRef idx="2">
+              <a:schemeClr val="accent1"/>
+            </a:effectRef>
+            <a:fontRef idx="minor">
+              <a:schemeClr val="lt1"/>
+            </a:fontRef>
+          </p:style>
+          <p:txBody>
+            <a:bodyPr rtlCol="0" anchor="ctr"/>
+            <a:lstStyle/>
+            <a:p>
+              <a:pPr algn="ctr"/>
+              <a:r>
+                <a:rPr lang="en-US" sz="3200" dirty="0" smtClean="0"/>
+                <a:t>CAN Transceivers</a:t>
+              </a:r>
+              <a:endParaRPr lang="en-US" sz="3200" dirty="0"/>
+            </a:p>
+          </p:txBody>
+        </p:sp>
+        <p:sp>
+          <p:nvSpPr>
+            <p:cNvPr id="48" name="Up Arrow 47"/>
+            <p:cNvSpPr/>
+            <p:nvPr/>
+          </p:nvSpPr>
+          <p:spPr>
+            <a:xfrm rot="5400000">
+              <a:off x="18692278" y="5650944"/>
+              <a:ext cx="1318878" cy="1624302"/>
+            </a:xfrm>
+            <a:prstGeom prst="upArrow">
+              <a:avLst/>
+            </a:prstGeom>
+          </p:spPr>
+          <p:style>
+            <a:lnRef idx="1">
+              <a:schemeClr val="accent1"/>
+            </a:lnRef>
+            <a:fillRef idx="3">
+              <a:schemeClr val="accent1"/>
+            </a:fillRef>
+            <a:effectRef idx="2">
+              <a:schemeClr val="accent1"/>
+            </a:effectRef>
+            <a:fontRef idx="minor">
+              <a:schemeClr val="lt1"/>
+            </a:fontRef>
+          </p:style>
+          <p:txBody>
+            <a:bodyPr rtlCol="0" anchor="ctr"/>
+            <a:lstStyle/>
+            <a:p>
+              <a:pPr algn="ctr"/>
+              <a:endParaRPr lang="en-US"/>
+            </a:p>
+          </p:txBody>
+        </p:sp>
+        <p:sp>
+          <p:nvSpPr>
+            <p:cNvPr id="52" name="Up Arrow 51"/>
+            <p:cNvSpPr/>
+            <p:nvPr/>
+          </p:nvSpPr>
+          <p:spPr>
+            <a:xfrm rot="10800000">
+              <a:off x="26540514" y="7594120"/>
+              <a:ext cx="1318879" cy="1624303"/>
+            </a:xfrm>
+            <a:prstGeom prst="upArrow">
+              <a:avLst/>
+            </a:prstGeom>
+          </p:spPr>
+          <p:style>
+            <a:lnRef idx="1">
+              <a:schemeClr val="accent1"/>
+            </a:lnRef>
+            <a:fillRef idx="3">
+              <a:schemeClr val="accent1"/>
+            </a:fillRef>
+            <a:effectRef idx="2">
+              <a:schemeClr val="accent1"/>
+            </a:effectRef>
+            <a:fontRef idx="minor">
+              <a:schemeClr val="lt1"/>
+            </a:fontRef>
+          </p:style>
+          <p:txBody>
+            <a:bodyPr rtlCol="0" anchor="ctr"/>
+            <a:lstStyle/>
+            <a:p>
+              <a:pPr algn="ctr"/>
+              <a:endParaRPr lang="en-US"/>
+            </a:p>
+          </p:txBody>
+        </p:sp>
+        <p:pic>
+          <p:nvPicPr>
+            <p:cNvPr id="53" name="Picture 52" descr="EV1.JPG"/>
+            <p:cNvPicPr>
+              <a:picLocks noChangeAspect="1"/>
+            </p:cNvPicPr>
+            <p:nvPr/>
+          </p:nvPicPr>
+          <p:blipFill rotWithShape="1">
+            <a:blip r:embed="rId11">
+              <a:extLst>
+                <a:ext uri="{28A0092B-C50C-407E-A947-70E740481C1C}">
+                  <a14:useLocalDpi xmlns:a14="http://schemas.microsoft.com/office/drawing/2010/main" val="0"/>
+                </a:ext>
+              </a:extLst>
+            </a:blip>
+            <a:srcRect l="34578"/>
+            <a:stretch/>
+          </p:blipFill>
+          <p:spPr>
+            <a:xfrm rot="5400000">
+              <a:off x="25733373" y="9077779"/>
+              <a:ext cx="2972809" cy="3408032"/>
+            </a:xfrm>
+            <a:prstGeom prst="rect">
+              <a:avLst/>
+            </a:prstGeom>
+          </p:spPr>
+        </p:pic>
+        <p:sp>
+          <p:nvSpPr>
+            <p:cNvPr id="55" name="Up Arrow 54"/>
+            <p:cNvSpPr/>
+            <p:nvPr/>
+          </p:nvSpPr>
+          <p:spPr>
+            <a:xfrm rot="5400000">
+              <a:off x="23911912" y="5650944"/>
+              <a:ext cx="1318878" cy="1624302"/>
+            </a:xfrm>
+            <a:prstGeom prst="upArrow">
+              <a:avLst/>
+            </a:prstGeom>
+          </p:spPr>
+          <p:style>
+            <a:lnRef idx="1">
+              <a:schemeClr val="accent1"/>
+            </a:lnRef>
+            <a:fillRef idx="3">
+              <a:schemeClr val="accent1"/>
+            </a:fillRef>
+            <a:effectRef idx="2">
+              <a:schemeClr val="accent1"/>
+            </a:effectRef>
+            <a:fontRef idx="minor">
+              <a:schemeClr val="lt1"/>
+            </a:fontRef>
+          </p:style>
+          <p:txBody>
+            <a:bodyPr rtlCol="0" anchor="ctr"/>
+            <a:lstStyle/>
+            <a:p>
+              <a:pPr algn="ctr"/>
+              <a:endParaRPr lang="en-US"/>
+            </a:p>
+          </p:txBody>
+        </p:sp>
+        <p:sp>
+          <p:nvSpPr>
+            <p:cNvPr id="57" name="Alternate Process 56"/>
+            <p:cNvSpPr/>
+            <p:nvPr/>
+          </p:nvSpPr>
+          <p:spPr>
+            <a:xfrm>
+              <a:off x="20244722" y="5653488"/>
+              <a:ext cx="3376327" cy="1729322"/>
+            </a:xfrm>
+            <a:prstGeom prst="flowChartAlternateProcess">
+              <a:avLst/>
+            </a:prstGeom>
+          </p:spPr>
+          <p:style>
+            <a:lnRef idx="1">
+              <a:schemeClr val="accent1"/>
+            </a:lnRef>
+            <a:fillRef idx="3">
+              <a:schemeClr val="accent1"/>
+            </a:fillRef>
+            <a:effectRef idx="2">
+              <a:schemeClr val="accent1"/>
+            </a:effectRef>
+            <a:fontRef idx="minor">
+              <a:schemeClr val="lt1"/>
+            </a:fontRef>
+          </p:style>
+          <p:txBody>
+            <a:bodyPr rtlCol="0" anchor="ctr"/>
+            <a:lstStyle/>
+            <a:p>
+              <a:pPr algn="ctr"/>
+              <a:r>
+                <a:rPr lang="en-US" sz="3200" dirty="0" smtClean="0"/>
+                <a:t>Microprocessor</a:t>
+              </a:r>
+            </a:p>
+          </p:txBody>
+        </p:sp>
+        <p:sp>
+          <p:nvSpPr>
+            <p:cNvPr id="58" name="Alternate Process 57"/>
+            <p:cNvSpPr/>
+            <p:nvPr/>
+          </p:nvSpPr>
+          <p:spPr>
+            <a:xfrm>
+              <a:off x="25464701" y="5722645"/>
+              <a:ext cx="3376327" cy="1729322"/>
+            </a:xfrm>
+            <a:prstGeom prst="flowChartAlternateProcess">
+              <a:avLst/>
+            </a:prstGeom>
+          </p:spPr>
+          <p:style>
+            <a:lnRef idx="1">
+              <a:schemeClr val="accent1"/>
+            </a:lnRef>
+            <a:fillRef idx="3">
+              <a:schemeClr val="accent1"/>
+            </a:fillRef>
+            <a:effectRef idx="2">
+              <a:schemeClr val="accent1"/>
+            </a:effectRef>
+            <a:fontRef idx="minor">
+              <a:schemeClr val="lt1"/>
+            </a:fontRef>
+          </p:style>
+          <p:txBody>
+            <a:bodyPr rtlCol="0" anchor="ctr"/>
+            <a:lstStyle/>
+            <a:p>
+              <a:pPr algn="ctr"/>
+              <a:r>
+                <a:rPr lang="en-US" sz="3200" dirty="0" smtClean="0"/>
+                <a:t>Screen</a:t>
+              </a:r>
+            </a:p>
+          </p:txBody>
+        </p:sp>
+        <p:sp>
+          <p:nvSpPr>
+            <p:cNvPr id="49" name="Rectangle 48"/>
+            <p:cNvSpPr/>
+            <p:nvPr/>
+          </p:nvSpPr>
+          <p:spPr>
+            <a:xfrm>
+              <a:off x="19596083" y="8381798"/>
+              <a:ext cx="5257833" cy="3354592"/>
+            </a:xfrm>
+            <a:prstGeom prst="rect">
+              <a:avLst/>
+            </a:prstGeom>
+          </p:spPr>
+          <p:style>
+            <a:lnRef idx="1">
+              <a:schemeClr val="accent1"/>
+            </a:lnRef>
+            <a:fillRef idx="3">
+              <a:schemeClr val="accent1"/>
+            </a:fillRef>
+            <a:effectRef idx="2">
+              <a:schemeClr val="accent1"/>
+            </a:effectRef>
+            <a:fontRef idx="minor">
+              <a:schemeClr val="lt1"/>
+            </a:fontRef>
+          </p:style>
+          <p:txBody>
+            <a:bodyPr rtlCol="0" anchor="ctr"/>
+            <a:lstStyle/>
+            <a:p>
+              <a:pPr algn="ctr"/>
+              <a:r>
+                <a:rPr lang="en-US" sz="3000" dirty="0" smtClean="0"/>
+                <a:t>Picture of whole unit here</a:t>
+              </a:r>
+              <a:endParaRPr lang="en-US" sz="3000" dirty="0"/>
+            </a:p>
+          </p:txBody>
+        </p:sp>
+      </p:grpSp>
       <p:sp>
         <p:nvSpPr>
           <p:cNvPr id="36" name="TextBox 35"/>
@@ -5507,7 +5522,7 @@
         </p:nvSpPr>
         <p:spPr>
           <a:xfrm>
-            <a:off x="30530800" y="6010795"/>
+            <a:off x="30530800" y="6671195"/>
             <a:ext cx="12126099" cy="1415772"/>
           </a:xfrm>
           <a:prstGeom prst="rect">

</xml_diff>

<commit_message>
Thank you, but our poster update is in another castle!
</commit_message>
<xml_diff>
--- a/Documentation/Poster/Poster.pptx
+++ b/Documentation/Poster/Poster.pptx
@@ -3540,8 +3540,8 @@
         </p:nvSpPr>
         <p:spPr>
           <a:xfrm>
-            <a:off x="3153104" y="0"/>
-            <a:ext cx="38026427" cy="3457667"/>
+            <a:off x="5130800" y="0"/>
+            <a:ext cx="34071036" cy="4368800"/>
           </a:xfrm>
           <a:prstGeom prst="rect">
             <a:avLst/>
@@ -3567,19 +3567,169 @@
           <a:bodyPr lIns="438912" tIns="219456" rIns="438912" bIns="219456" spcCol="0" rtlCol="0" anchor="ctr"/>
           <a:lstStyle/>
           <a:p>
-            <a:pPr algn="ctr"/>
-            <a:r>
-              <a:rPr lang="en-US" sz="9600" dirty="0" smtClean="0">
+            <a:pPr algn="ctr">
+              <a:lnSpc>
+                <a:spcPct val="50000"/>
+              </a:lnSpc>
+            </a:pPr>
+            <a:r>
+              <a:rPr lang="en-US" sz="8800" dirty="0" smtClean="0">
                 <a:latin typeface="BlairMdITC TT-Medium"/>
                 <a:cs typeface="BlairMdITC TT-Medium"/>
               </a:rPr>
-              <a:t>Digital Dash for SAE Electric Race Car</a:t>
-            </a:r>
-            <a:endParaRPr lang="en-US" sz="9600" dirty="0">
+              <a:t>Digital Dash for SAE Electric </a:t>
+            </a:r>
+            <a:r>
+              <a:rPr lang="en-US" sz="8800" smtClean="0">
+                <a:latin typeface="BlairMdITC TT-Medium"/>
+                <a:cs typeface="BlairMdITC TT-Medium"/>
+              </a:rPr>
+              <a:t>Race </a:t>
+            </a:r>
+            <a:r>
+              <a:rPr lang="en-US" sz="8800" smtClean="0">
+                <a:latin typeface="BlairMdITC TT-Medium"/>
+                <a:cs typeface="BlairMdITC TT-Medium"/>
+              </a:rPr>
+              <a:t>Car</a:t>
+            </a:r>
+          </a:p>
+          <a:p>
+            <a:pPr algn="ctr">
+              <a:lnSpc>
+                <a:spcPct val="50000"/>
+              </a:lnSpc>
+            </a:pPr>
+            <a:endParaRPr lang="en-US" sz="8800" dirty="0" smtClean="0">
               <a:latin typeface="BlairMdITC TT-Medium"/>
               <a:cs typeface="BlairMdITC TT-Medium"/>
             </a:endParaRPr>
           </a:p>
+          <a:p>
+            <a:pPr algn="ctr"/>
+            <a:r>
+              <a:rPr lang="en-US" sz="2400" dirty="0" smtClean="0">
+                <a:latin typeface="BlairMdITC TT-Medium"/>
+                <a:cs typeface="BlairMdITC TT-Medium"/>
+              </a:rPr>
+              <a:t>Capstone Team: Noah Erickson, Chad </a:t>
+            </a:r>
+            <a:r>
+              <a:rPr lang="en-US" sz="2400" dirty="0" err="1" smtClean="0">
+                <a:latin typeface="BlairMdITC TT-Medium"/>
+                <a:cs typeface="BlairMdITC TT-Medium"/>
+              </a:rPr>
+              <a:t>Thueson</a:t>
+            </a:r>
+            <a:r>
+              <a:rPr lang="en-US" sz="2400" dirty="0" smtClean="0">
+                <a:latin typeface="BlairMdITC TT-Medium"/>
+                <a:cs typeface="BlairMdITC TT-Medium"/>
+              </a:rPr>
+              <a:t>, </a:t>
+            </a:r>
+            <a:r>
+              <a:rPr lang="en-US" sz="2400" dirty="0" err="1" smtClean="0">
+                <a:latin typeface="BlairMdITC TT-Medium"/>
+                <a:cs typeface="BlairMdITC TT-Medium"/>
+              </a:rPr>
+              <a:t>Rishal</a:t>
+            </a:r>
+            <a:r>
+              <a:rPr lang="en-US" sz="2400" dirty="0" smtClean="0">
+                <a:latin typeface="BlairMdITC TT-Medium"/>
+                <a:cs typeface="BlairMdITC TT-Medium"/>
+              </a:rPr>
+              <a:t> </a:t>
+            </a:r>
+            <a:r>
+              <a:rPr lang="en-US" sz="2400" dirty="0" err="1" smtClean="0">
+                <a:latin typeface="BlairMdITC TT-Medium"/>
+                <a:cs typeface="BlairMdITC TT-Medium"/>
+              </a:rPr>
+              <a:t>Dass</a:t>
+            </a:r>
+            <a:r>
+              <a:rPr lang="en-US" sz="2400" dirty="0" smtClean="0">
+                <a:latin typeface="BlairMdITC TT-Medium"/>
+                <a:cs typeface="BlairMdITC TT-Medium"/>
+              </a:rPr>
+              <a:t>, Jaime Rodriguez, Sean </a:t>
+            </a:r>
+            <a:r>
+              <a:rPr lang="en-US" sz="2400" dirty="0" err="1" smtClean="0">
+                <a:latin typeface="BlairMdITC TT-Medium"/>
+                <a:cs typeface="BlairMdITC TT-Medium"/>
+              </a:rPr>
+              <a:t>Koppenhafer</a:t>
+            </a:r>
+            <a:endParaRPr lang="en-US" sz="2400" dirty="0" smtClean="0">
+              <a:latin typeface="BlairMdITC TT-Medium"/>
+              <a:cs typeface="BlairMdITC TT-Medium"/>
+            </a:endParaRPr>
+          </a:p>
+          <a:p>
+            <a:pPr algn="ctr"/>
+            <a:r>
+              <a:rPr lang="en-US" sz="2400" dirty="0" smtClean="0">
+                <a:latin typeface="BlairMdITC TT-Medium"/>
+                <a:cs typeface="BlairMdITC TT-Medium"/>
+              </a:rPr>
+              <a:t>Project Sponsor: Michal </a:t>
+            </a:r>
+            <a:r>
+              <a:rPr lang="en-US" sz="2400" dirty="0" err="1" smtClean="0">
+                <a:latin typeface="BlairMdITC TT-Medium"/>
+                <a:cs typeface="BlairMdITC TT-Medium"/>
+              </a:rPr>
+              <a:t>Podhrasky</a:t>
+            </a:r>
+            <a:r>
+              <a:rPr lang="en-US" sz="2400" dirty="0" smtClean="0">
+                <a:latin typeface="BlairMdITC TT-Medium"/>
+                <a:cs typeface="BlairMdITC TT-Medium"/>
+              </a:rPr>
+              <a:t> – Viking Motorsports Team</a:t>
+            </a:r>
+          </a:p>
+          <a:p>
+            <a:pPr algn="ctr"/>
+            <a:r>
+              <a:rPr lang="en-US" sz="2400" dirty="0" smtClean="0">
+                <a:latin typeface="BlairMdITC TT-Medium"/>
+                <a:cs typeface="BlairMdITC TT-Medium"/>
+              </a:rPr>
+              <a:t>Capstone Advisor: Dr. </a:t>
+            </a:r>
+            <a:r>
+              <a:rPr lang="en-US" sz="2400" dirty="0" err="1" smtClean="0">
+                <a:latin typeface="BlairMdITC TT-Medium"/>
+                <a:cs typeface="BlairMdITC TT-Medium"/>
+              </a:rPr>
+              <a:t>Christof</a:t>
+            </a:r>
+            <a:r>
+              <a:rPr lang="en-US" sz="2400" dirty="0" smtClean="0">
+                <a:latin typeface="BlairMdITC TT-Medium"/>
+                <a:cs typeface="BlairMdITC TT-Medium"/>
+              </a:rPr>
+              <a:t> </a:t>
+            </a:r>
+            <a:r>
+              <a:rPr lang="en-US" sz="2400" dirty="0" err="1" smtClean="0">
+                <a:latin typeface="BlairMdITC TT-Medium"/>
+                <a:cs typeface="BlairMdITC TT-Medium"/>
+              </a:rPr>
+              <a:t>Teuscher</a:t>
+            </a:r>
+            <a:r>
+              <a:rPr lang="en-US" sz="2400" dirty="0" smtClean="0">
+                <a:latin typeface="BlairMdITC TT-Medium"/>
+                <a:cs typeface="BlairMdITC TT-Medium"/>
+              </a:rPr>
+              <a:t> – Portland State University ECE Department</a:t>
+            </a:r>
+          </a:p>
         </p:txBody>
       </p:sp>
       <p:sp>
@@ -3590,8 +3740,8 @@
         </p:nvSpPr>
         <p:spPr>
           <a:xfrm>
-            <a:off x="486195" y="3912067"/>
-            <a:ext cx="13334863" cy="9372133"/>
+            <a:off x="486195" y="4945128"/>
+            <a:ext cx="13334863" cy="8339072"/>
           </a:xfrm>
           <a:prstGeom prst="roundRect">
             <a:avLst/>
@@ -3634,7 +3784,7 @@
         </p:nvSpPr>
         <p:spPr>
           <a:xfrm>
-            <a:off x="3662228" y="4064568"/>
+            <a:off x="3662228" y="4826568"/>
             <a:ext cx="7188135" cy="1366528"/>
           </a:xfrm>
           <a:prstGeom prst="rect">
@@ -3676,7 +3826,7 @@
         </p:nvSpPr>
         <p:spPr>
           <a:xfrm>
-            <a:off x="1016000" y="5209621"/>
+            <a:off x="1016000" y="5971621"/>
             <a:ext cx="8204201" cy="6001642"/>
           </a:xfrm>
           <a:prstGeom prst="rect">
@@ -3693,11 +3843,7 @@
             <a:pPr algn="just"/>
             <a:r>
               <a:rPr lang="en-US" sz="3200" dirty="0" smtClean="0"/>
-              <a:t>In the realm of racing each car is designed completely different based on several factors not limited to driver preferences, resources available and technical limitations. </a:t>
-            </a:r>
-            <a:r>
-              <a:rPr lang="en-US" sz="3200" dirty="0" smtClean="0"/>
-              <a:t>A few popular choices for digital dashboards currently exist. The popular </a:t>
+              <a:t>In the realm of racing each car is designed completely different based on several factors not limited to driver preferences, resources available and technical limitations. A few popular choices for digital dashboards currently exist. The popular </a:t>
             </a:r>
             <a:r>
               <a:rPr lang="en-US" sz="3200" dirty="0" err="1" smtClean="0"/>
@@ -4111,11 +4257,7 @@
             </a:r>
             <a:r>
               <a:rPr lang="en-US" sz="3200" dirty="0" smtClean="0"/>
-              <a:t> Due as an early prototyping platform while simultaneously designing a custom circuit board to house the ATSAM3X. </a:t>
-            </a:r>
-            <a:r>
-              <a:rPr lang="en-US" sz="3200" dirty="0" smtClean="0"/>
-              <a:t>Another large decision was the screen used since needed to have a high resolution while having a compact size. The high resolution is necessary to draw gauges, icons and bars all on the screen at once while the compact size is required by the layout of the vehicles frame.</a:t>
+              <a:t> Due as an early prototyping platform while simultaneously designing a custom circuit board to house the ATSAM3X. Another large decision was the screen used since needed to have a high resolution while having a compact size. The high resolution is necessary to draw gauges, icons and bars all on the screen at once while the compact size is required by the layout of the vehicles frame.</a:t>
             </a:r>
             <a:endParaRPr lang="en-US" sz="3200" dirty="0"/>
           </a:p>
@@ -4354,8 +4496,8 @@
         </p:blipFill>
         <p:spPr bwMode="auto">
           <a:xfrm>
-            <a:off x="48063" y="1059520"/>
-            <a:ext cx="3105040" cy="2484032"/>
+            <a:off x="39468550" y="803631"/>
+            <a:ext cx="3757961" cy="3006369"/>
           </a:xfrm>
           <a:prstGeom prst="rect">
             <a:avLst/>
@@ -4395,8 +4537,8 @@
         </p:blipFill>
         <p:spPr bwMode="auto">
           <a:xfrm>
-            <a:off x="16532" y="27364"/>
-            <a:ext cx="3136571" cy="1032155"/>
+            <a:off x="-34267" y="1362431"/>
+            <a:ext cx="5114268" cy="1682958"/>
           </a:xfrm>
           <a:prstGeom prst="rect">
             <a:avLst/>
@@ -4490,7 +4632,7 @@
         </p:blipFill>
         <p:spPr>
           <a:xfrm>
-            <a:off x="9485029" y="5431096"/>
+            <a:off x="9485029" y="6294696"/>
             <a:ext cx="3915363" cy="3296802"/>
           </a:xfrm>
           <a:prstGeom prst="rect">
@@ -4603,13 +4745,8 @@
             </a:pPr>
             <a:r>
               <a:rPr lang="en-US" sz="3200" dirty="0" smtClean="0"/>
-              <a:t>The custom PCB to cut down </a:t>
-            </a:r>
-            <a:r>
-              <a:rPr lang="en-US" sz="3200" dirty="0" smtClean="0"/>
-              <a:t>size</a:t>
-            </a:r>
-            <a:endParaRPr lang="en-US" sz="3200" dirty="0" smtClean="0"/>
+              <a:t>The custom PCB to cut down size</a:t>
+            </a:r>
           </a:p>
         </p:txBody>
       </p:sp>
@@ -4643,7 +4780,6 @@
               <a:rPr lang="en-US" sz="3200" dirty="0" smtClean="0"/>
               <a:t>The digital dash could be implemented on the internal combustion car</a:t>
             </a:r>
-            <a:endParaRPr lang="en-US" sz="3200" dirty="0" smtClean="0"/>
           </a:p>
           <a:p>
             <a:pPr marL="342900" indent="-342900">
@@ -4654,7 +4790,6 @@
               <a:rPr lang="en-US" sz="3200" dirty="0" smtClean="0"/>
               <a:t>Screen size could be maximized to fit the vehicles dash</a:t>
             </a:r>
-            <a:endParaRPr lang="en-US" sz="3200" dirty="0" smtClean="0"/>
           </a:p>
           <a:p>
             <a:pPr marL="342900" indent="-342900">
@@ -4665,7 +4800,6 @@
               <a:rPr lang="en-US" sz="3200" dirty="0" smtClean="0"/>
               <a:t>The mainboard could be reprinted with the changes made, this would cut down on mod wires, cut traces and test connections</a:t>
             </a:r>
-            <a:endParaRPr lang="en-US" sz="3200" dirty="0" smtClean="0"/>
           </a:p>
           <a:p>
             <a:pPr marL="342900" indent="-342900">
@@ -4674,11 +4808,7 @@
             </a:pPr>
             <a:r>
               <a:rPr lang="en-US" sz="3200" dirty="0" smtClean="0"/>
-              <a:t>An improved power supply could be implemented to cut down on power </a:t>
-            </a:r>
-            <a:r>
-              <a:rPr lang="en-US" sz="3200" dirty="0" smtClean="0"/>
-              <a:t>consumption and </a:t>
+              <a:t>An improved power supply could be implemented to cut down on power consumption and </a:t>
             </a:r>
             <a:r>
               <a:rPr lang="en-US" sz="3200" dirty="0" err="1" smtClean="0"/>
@@ -4688,7 +4818,6 @@
               <a:rPr lang="en-US" sz="3200" dirty="0" smtClean="0"/>
               <a:t> with a 12V system.</a:t>
             </a:r>
-            <a:endParaRPr lang="en-US" sz="3200" dirty="0" smtClean="0"/>
           </a:p>
           <a:p>
             <a:pPr marL="342900" indent="-342900">
@@ -4938,15 +5067,7 @@
             </a:r>
             <a:r>
               <a:rPr lang="en-US" sz="3200" dirty="0" smtClean="0"/>
-              <a:t>ntroduce onto a racecar require increased diagnostics t</a:t>
-            </a:r>
-            <a:r>
-              <a:rPr lang="en-US" sz="3200" dirty="0" smtClean="0"/>
-              <a:t>o keep the car running safely. The Viking Motorsports team had previously used a simple bank of LEDs to indicate problems with mission critical systems.  Troubleshooting these problems required the car to be off the track and logged data to be analyzed. With the addition of a digital dash system that reads data in real time from the vehicle control unit the driver could be kept up to date on system functionality either on track or </a:t>
-            </a:r>
-            <a:r>
-              <a:rPr lang="en-US" sz="3200" dirty="0" smtClean="0"/>
-              <a:t>in the pit stop.</a:t>
+              <a:t>ntroduce onto a racecar require increased diagnostics to keep the car running safely. The Viking Motorsports team had previously used a simple bank of LEDs to indicate problems with mission critical systems.  Troubleshooting these problems required the car to be off the track and logged data to be analyzed. With the addition of a digital dash system that reads data in real time from the vehicle control unit the driver could be kept up to date on system functionality either on track or in the pit stop.</a:t>
             </a:r>
             <a:endParaRPr lang="en-US" sz="3200" dirty="0"/>
           </a:p>
@@ -4968,7 +5089,7 @@
         </p:blipFill>
         <p:spPr>
           <a:xfrm>
-            <a:off x="9954461" y="8949107"/>
+            <a:off x="9751261" y="9507907"/>
             <a:ext cx="3405939" cy="3405939"/>
           </a:xfrm>
           <a:prstGeom prst="rect">
@@ -5523,7 +5644,7 @@
         <p:spPr>
           <a:xfrm>
             <a:off x="30530800" y="6671195"/>
-            <a:ext cx="12126099" cy="1415772"/>
+            <a:ext cx="9951062" cy="1415772"/>
           </a:xfrm>
           <a:prstGeom prst="rect">
             <a:avLst/>
@@ -5538,7 +5659,15 @@
           <a:p>
             <a:r>
               <a:rPr lang="en-US" dirty="0" smtClean="0"/>
-              <a:t>Oh yeah, it even performs.</a:t>
+              <a:t>Oh yeah, </a:t>
+            </a:r>
+            <a:r>
+              <a:rPr lang="en-US" dirty="0" smtClean="0"/>
+              <a:t>it </a:t>
+            </a:r>
+            <a:r>
+              <a:rPr lang="en-US" dirty="0" smtClean="0"/>
+              <a:t>performs.</a:t>
             </a:r>
             <a:endParaRPr lang="en-US" dirty="0"/>
           </a:p>

</xml_diff>